<commit_message>
Made a bunch of changes, cleaned up some files, reorganized repo
</commit_message>
<xml_diff>
--- a/LockOn.pptx
+++ b/LockOn.pptx
@@ -122,6 +122,22 @@
       </a:defRPr>
     </a:lvl9pPr>
   </p:defaultTextStyle>
+  <p:extLst>
+    <p:ext uri="{EFAFB233-063F-42B5-8137-9DF3F51BA10A}">
+      <p15:sldGuideLst xmlns:p15="http://schemas.microsoft.com/office/powerpoint/2012/main">
+        <p15:guide id="1" orient="horz" pos="2160">
+          <p15:clr>
+            <a:srgbClr val="A4A3A4"/>
+          </p15:clr>
+        </p15:guide>
+        <p15:guide id="2" pos="3840">
+          <p15:clr>
+            <a:srgbClr val="A4A3A4"/>
+          </p15:clr>
+        </p15:guide>
+      </p15:sldGuideLst>
+    </p:ext>
+  </p:extLst>
 </p:presentation>
 </file>
 
@@ -295,7 +311,7 @@
             <a:fld id="{B61BEF0D-F0BB-DE4B-95CE-6DB70DBA9567}" type="datetimeFigureOut">
               <a:rPr lang="en-US" smtClean="0"/>
               <a:pPr/>
-              <a:t>4/7/16</a:t>
+              <a:t>4/10/16</a:t>
             </a:fld>
             <a:endParaRPr lang="en-US" dirty="0"/>
           </a:p>
@@ -511,7 +527,7 @@
   </p:clrMapOvr>
   <p:extLst>
     <p:ext uri="{DCECCB84-F9BA-43D5-87BE-67443E8EF086}">
-      <p15:sldGuideLst xmlns:p15="http://schemas.microsoft.com/office/powerpoint/2012/main" xmlns=""/>
+      <p15:sldGuideLst xmlns:p15="http://schemas.microsoft.com/office/powerpoint/2012/main"/>
     </p:ext>
   </p:extLst>
 </p:sldLayout>
@@ -632,7 +648,7 @@
             <a:fld id="{B61BEF0D-F0BB-DE4B-95CE-6DB70DBA9567}" type="datetimeFigureOut">
               <a:rPr lang="en-US" smtClean="0"/>
               <a:pPr/>
-              <a:t>4/7/16</a:t>
+              <a:t>4/10/16</a:t>
             </a:fld>
             <a:endParaRPr lang="en-US" dirty="0"/>
           </a:p>
@@ -814,7 +830,7 @@
             <a:fld id="{B61BEF0D-F0BB-DE4B-95CE-6DB70DBA9567}" type="datetimeFigureOut">
               <a:rPr lang="en-US" smtClean="0"/>
               <a:pPr/>
-              <a:t>4/7/16</a:t>
+              <a:t>4/10/16</a:t>
             </a:fld>
             <a:endParaRPr lang="en-US" dirty="0"/>
           </a:p>
@@ -875,7 +891,7 @@
   </p:clrMapOvr>
   <p:extLst>
     <p:ext uri="{DCECCB84-F9BA-43D5-87BE-67443E8EF086}">
-      <p15:sldGuideLst xmlns:p15="http://schemas.microsoft.com/office/powerpoint/2012/main" xmlns=""/>
+      <p15:sldGuideLst xmlns:p15="http://schemas.microsoft.com/office/powerpoint/2012/main"/>
     </p:ext>
   </p:extLst>
 </p:sldLayout>
@@ -991,7 +1007,7 @@
             <a:fld id="{B61BEF0D-F0BB-DE4B-95CE-6DB70DBA9567}" type="datetimeFigureOut">
               <a:rPr lang="en-US" smtClean="0"/>
               <a:pPr/>
-              <a:t>4/7/16</a:t>
+              <a:t>4/10/16</a:t>
             </a:fld>
             <a:endParaRPr lang="en-US" dirty="0"/>
           </a:p>
@@ -1270,7 +1286,7 @@
             <a:fld id="{B61BEF0D-F0BB-DE4B-95CE-6DB70DBA9567}" type="datetimeFigureOut">
               <a:rPr lang="en-US" smtClean="0"/>
               <a:pPr/>
-              <a:t>4/7/16</a:t>
+              <a:t>4/10/16</a:t>
             </a:fld>
             <a:endParaRPr lang="en-US" dirty="0"/>
           </a:p>
@@ -1413,7 +1429,7 @@
   </p:clrMapOvr>
   <p:extLst>
     <p:ext uri="{DCECCB84-F9BA-43D5-87BE-67443E8EF086}">
-      <p15:sldGuideLst xmlns:p15="http://schemas.microsoft.com/office/powerpoint/2012/main" xmlns=""/>
+      <p15:sldGuideLst xmlns:p15="http://schemas.microsoft.com/office/powerpoint/2012/main"/>
     </p:ext>
   </p:extLst>
 </p:sldLayout>
@@ -1671,7 +1687,7 @@
             <a:fld id="{B61BEF0D-F0BB-DE4B-95CE-6DB70DBA9567}" type="datetimeFigureOut">
               <a:rPr lang="en-US" smtClean="0"/>
               <a:pPr/>
-              <a:t>4/7/16</a:t>
+              <a:t>4/10/16</a:t>
             </a:fld>
             <a:endParaRPr lang="en-US" dirty="0"/>
           </a:p>
@@ -1732,7 +1748,7 @@
   </p:clrMapOvr>
   <p:extLst>
     <p:ext uri="{DCECCB84-F9BA-43D5-87BE-67443E8EF086}">
-      <p15:sldGuideLst xmlns:p15="http://schemas.microsoft.com/office/powerpoint/2012/main" xmlns=""/>
+      <p15:sldGuideLst xmlns:p15="http://schemas.microsoft.com/office/powerpoint/2012/main"/>
     </p:ext>
   </p:extLst>
 </p:sldLayout>
@@ -2155,7 +2171,7 @@
             <a:fld id="{B61BEF0D-F0BB-DE4B-95CE-6DB70DBA9567}" type="datetimeFigureOut">
               <a:rPr lang="en-US" smtClean="0"/>
               <a:pPr/>
-              <a:t>4/7/16</a:t>
+              <a:t>4/10/16</a:t>
             </a:fld>
             <a:endParaRPr lang="en-US" dirty="0"/>
           </a:p>
@@ -2216,7 +2232,7 @@
   </p:clrMapOvr>
   <p:extLst>
     <p:ext uri="{DCECCB84-F9BA-43D5-87BE-67443E8EF086}">
-      <p15:sldGuideLst xmlns:p15="http://schemas.microsoft.com/office/powerpoint/2012/main" xmlns=""/>
+      <p15:sldGuideLst xmlns:p15="http://schemas.microsoft.com/office/powerpoint/2012/main"/>
     </p:ext>
   </p:extLst>
 </p:sldLayout>
@@ -2280,7 +2296,7 @@
             <a:fld id="{B61BEF0D-F0BB-DE4B-95CE-6DB70DBA9567}" type="datetimeFigureOut">
               <a:rPr lang="en-US" smtClean="0"/>
               <a:pPr/>
-              <a:t>4/7/16</a:t>
+              <a:t>4/10/16</a:t>
             </a:fld>
             <a:endParaRPr lang="en-US" dirty="0"/>
           </a:p>
@@ -2377,7 +2393,7 @@
             <a:fld id="{B61BEF0D-F0BB-DE4B-95CE-6DB70DBA9567}" type="datetimeFigureOut">
               <a:rPr lang="en-US" smtClean="0"/>
               <a:pPr/>
-              <a:t>4/7/16</a:t>
+              <a:t>4/10/16</a:t>
             </a:fld>
             <a:endParaRPr lang="en-US" dirty="0"/>
           </a:p>
@@ -2438,7 +2454,7 @@
   </p:clrMapOvr>
   <p:extLst>
     <p:ext uri="{DCECCB84-F9BA-43D5-87BE-67443E8EF086}">
-      <p15:sldGuideLst xmlns:p15="http://schemas.microsoft.com/office/powerpoint/2012/main" xmlns=""/>
+      <p15:sldGuideLst xmlns:p15="http://schemas.microsoft.com/office/powerpoint/2012/main"/>
     </p:ext>
   </p:extLst>
 </p:sldLayout>
@@ -2730,7 +2746,7 @@
             <a:fld id="{B61BEF0D-F0BB-DE4B-95CE-6DB70DBA9567}" type="datetimeFigureOut">
               <a:rPr lang="en-US" smtClean="0"/>
               <a:pPr/>
-              <a:t>4/7/16</a:t>
+              <a:t>4/10/16</a:t>
             </a:fld>
             <a:endParaRPr lang="en-US" dirty="0"/>
           </a:p>
@@ -2855,7 +2871,7 @@
   </p:clrMapOvr>
   <p:extLst>
     <p:ext uri="{DCECCB84-F9BA-43D5-87BE-67443E8EF086}">
-      <p15:sldGuideLst xmlns:p15="http://schemas.microsoft.com/office/powerpoint/2012/main" xmlns=""/>
+      <p15:sldGuideLst xmlns:p15="http://schemas.microsoft.com/office/powerpoint/2012/main"/>
     </p:ext>
   </p:extLst>
 </p:sldLayout>
@@ -3125,7 +3141,7 @@
             <a:fld id="{B61BEF0D-F0BB-DE4B-95CE-6DB70DBA9567}" type="datetimeFigureOut">
               <a:rPr lang="en-US" smtClean="0"/>
               <a:pPr/>
-              <a:t>4/7/16</a:t>
+              <a:t>4/10/16</a:t>
             </a:fld>
             <a:endParaRPr lang="en-US" dirty="0"/>
           </a:p>
@@ -3405,7 +3421,7 @@
             <a:fld id="{B61BEF0D-F0BB-DE4B-95CE-6DB70DBA9567}" type="datetimeFigureOut">
               <a:rPr lang="en-US" smtClean="0"/>
               <a:pPr/>
-              <a:t>4/7/16</a:t>
+              <a:t>4/10/16</a:t>
             </a:fld>
             <a:endParaRPr lang="en-US" dirty="0"/>
           </a:p>
@@ -3854,7 +3870,7 @@
   </p:txStyles>
   <p:extLst mod="1">
     <p:ext uri="{27BBF7A9-308A-43DC-89C8-2F10F3537804}">
-      <p15:sldGuideLst xmlns:p15="http://schemas.microsoft.com/office/powerpoint/2012/main" xmlns="">
+      <p15:sldGuideLst xmlns:p15="http://schemas.microsoft.com/office/powerpoint/2012/main">
         <p15:guide id="3" orient="horz" pos="1368">
           <p15:clr>
             <a:srgbClr val="F26B43"/>
@@ -4005,7 +4021,7 @@
   <p:timing>
     <p:tnLst>
       <p:par>
-        <p:cTn xmlns:p14="http://schemas.microsoft.com/office/powerpoint/2010/main" id="1" dur="indefinite" restart="never" nodeType="tmRoot"/>
+        <p:cTn id="1" dur="indefinite" restart="never" nodeType="tmRoot"/>
       </p:par>
     </p:tnLst>
   </p:timing>
@@ -4126,7 +4142,7 @@
   <p:timing>
     <p:tnLst>
       <p:par>
-        <p:cTn xmlns:p14="http://schemas.microsoft.com/office/powerpoint/2010/main" id="1" dur="indefinite" restart="never" nodeType="tmRoot"/>
+        <p:cTn id="1" dur="indefinite" restart="never" nodeType="tmRoot"/>
       </p:par>
     </p:tnLst>
   </p:timing>
@@ -4217,7 +4233,7 @@
   <p:timing>
     <p:tnLst>
       <p:par>
-        <p:cTn xmlns:p14="http://schemas.microsoft.com/office/powerpoint/2010/main" id="1" dur="indefinite" restart="never" nodeType="tmRoot"/>
+        <p:cTn id="1" dur="indefinite" restart="never" nodeType="tmRoot"/>
       </p:par>
     </p:tnLst>
   </p:timing>
@@ -4300,7 +4316,7 @@
   <p:timing>
     <p:tnLst>
       <p:par>
-        <p:cTn xmlns:p14="http://schemas.microsoft.com/office/powerpoint/2010/main" id="1" dur="indefinite" restart="never" nodeType="tmRoot"/>
+        <p:cTn id="1" dur="indefinite" restart="never" nodeType="tmRoot"/>
       </p:par>
     </p:tnLst>
   </p:timing>
@@ -4421,7 +4437,7 @@
   <p:timing>
     <p:tnLst>
       <p:par>
-        <p:cTn xmlns:p14="http://schemas.microsoft.com/office/powerpoint/2010/main" id="1" dur="indefinite" restart="never" nodeType="tmRoot"/>
+        <p:cTn id="1" dur="indefinite" restart="never" nodeType="tmRoot"/>
       </p:par>
     </p:tnLst>
   </p:timing>
@@ -4500,7 +4516,7 @@
   <p:timing>
     <p:tnLst>
       <p:par>
-        <p:cTn xmlns:p14="http://schemas.microsoft.com/office/powerpoint/2010/main" id="1" dur="indefinite" restart="never" nodeType="tmRoot"/>
+        <p:cTn id="1" dur="indefinite" restart="never" nodeType="tmRoot"/>
       </p:par>
     </p:tnLst>
   </p:timing>
@@ -4579,7 +4595,7 @@
   <p:timing>
     <p:tnLst>
       <p:par>
-        <p:cTn xmlns:p14="http://schemas.microsoft.com/office/powerpoint/2010/main" id="1" dur="indefinite" restart="never" nodeType="tmRoot"/>
+        <p:cTn id="1" dur="indefinite" restart="never" nodeType="tmRoot"/>
       </p:par>
     </p:tnLst>
   </p:timing>
@@ -4706,7 +4722,7 @@
   <p:timing>
     <p:tnLst>
       <p:par>
-        <p:cTn xmlns:p14="http://schemas.microsoft.com/office/powerpoint/2010/main" id="1" dur="indefinite" restart="never" nodeType="tmRoot"/>
+        <p:cTn id="1" dur="indefinite" restart="never" nodeType="tmRoot"/>
       </p:par>
     </p:tnLst>
   </p:timing>
@@ -4785,7 +4801,7 @@
   <p:timing>
     <p:tnLst>
       <p:par>
-        <p:cTn xmlns:p14="http://schemas.microsoft.com/office/powerpoint/2010/main" id="1" dur="indefinite" restart="never" nodeType="tmRoot"/>
+        <p:cTn id="1" dur="indefinite" restart="never" nodeType="tmRoot"/>
       </p:par>
     </p:tnLst>
   </p:timing>
@@ -4864,7 +4880,7 @@
   <p:timing>
     <p:tnLst>
       <p:par>
-        <p:cTn xmlns:p14="http://schemas.microsoft.com/office/powerpoint/2010/main" id="1" dur="indefinite" restart="never" nodeType="tmRoot"/>
+        <p:cTn id="1" dur="indefinite" restart="never" nodeType="tmRoot"/>
       </p:par>
     </p:tnLst>
   </p:timing>
@@ -4943,7 +4959,7 @@
   <p:timing>
     <p:tnLst>
       <p:par>
-        <p:cTn xmlns:p14="http://schemas.microsoft.com/office/powerpoint/2010/main" id="1" dur="indefinite" restart="never" nodeType="tmRoot"/>
+        <p:cTn id="1" dur="indefinite" restart="never" nodeType="tmRoot"/>
       </p:par>
     </p:tnLst>
   </p:timing>
@@ -5050,7 +5066,7 @@
   <p:timing>
     <p:tnLst>
       <p:par>
-        <p:cTn xmlns:p14="http://schemas.microsoft.com/office/powerpoint/2010/main" id="1" dur="indefinite" restart="never" nodeType="tmRoot"/>
+        <p:cTn id="1" dur="indefinite" restart="never" nodeType="tmRoot"/>
       </p:par>
     </p:tnLst>
   </p:timing>
@@ -5128,7 +5144,15 @@
             <a:pPr lvl="1"/>
             <a:r>
               <a:rPr lang="en-US" dirty="0" smtClean="0"/>
-              <a:t>Meryl Stav, CFO,</a:t>
+              <a:t>Meryl Stav, </a:t>
+            </a:r>
+            <a:r>
+              <a:rPr lang="en-US" dirty="0" smtClean="0"/>
+              <a:t>COO</a:t>
+            </a:r>
+            <a:r>
+              <a:rPr lang="en-US" dirty="0" smtClean="0"/>
+              <a:t>,</a:t>
             </a:r>
           </a:p>
           <a:p>
@@ -5183,7 +5207,7 @@
   <p:timing>
     <p:tnLst>
       <p:par>
-        <p:cTn xmlns:p14="http://schemas.microsoft.com/office/powerpoint/2010/main" id="1" dur="indefinite" restart="never" nodeType="tmRoot"/>
+        <p:cTn id="1" dur="indefinite" restart="never" nodeType="tmRoot"/>
       </p:par>
     </p:tnLst>
   </p:timing>
@@ -5274,7 +5298,7 @@
   <p:timing>
     <p:tnLst>
       <p:par>
-        <p:cTn xmlns:p14="http://schemas.microsoft.com/office/powerpoint/2010/main" id="1" dur="indefinite" restart="never" nodeType="tmRoot"/>
+        <p:cTn id="1" dur="indefinite" restart="never" nodeType="tmRoot"/>
       </p:par>
     </p:tnLst>
   </p:timing>
@@ -5315,7 +5339,11 @@
           <a:p>
             <a:r>
               <a:rPr lang="en-US" dirty="0" smtClean="0"/>
-              <a:t>Introduction: Meryl Stav, CFO</a:t>
+              <a:t>Introduction: Meryl Stav, </a:t>
+            </a:r>
+            <a:r>
+              <a:rPr lang="en-US" dirty="0" smtClean="0"/>
+              <a:t>COO</a:t>
             </a:r>
             <a:endParaRPr lang="en-US" dirty="0"/>
           </a:p>
@@ -5338,7 +5366,13 @@
           <a:p>
             <a:r>
               <a:rPr lang="en-US" dirty="0" smtClean="0"/>
-              <a:t>Put in some stuff about background here</a:t>
+              <a:t>Bachelor’s of Science in Mathematics and Computer Science from Northeastern University</a:t>
+            </a:r>
+          </a:p>
+          <a:p>
+            <a:r>
+              <a:rPr lang="en-US" dirty="0" smtClean="0"/>
+              <a:t>Assistant Staff in Open and Embedded Systems Group of ISR and Tactical Systems Division of MIT Lincoln Laboratory</a:t>
             </a:r>
             <a:endParaRPr lang="en-US" dirty="0"/>
           </a:p>
@@ -5357,7 +5391,7 @@
   <p:timing>
     <p:tnLst>
       <p:par>
-        <p:cTn xmlns:p14="http://schemas.microsoft.com/office/powerpoint/2010/main" id="1" dur="indefinite" restart="never" nodeType="tmRoot"/>
+        <p:cTn id="1" dur="indefinite" restart="never" nodeType="tmRoot"/>
       </p:par>
     </p:tnLst>
   </p:timing>
@@ -5424,8 +5458,12 @@
           <a:lstStyle/>
           <a:p>
             <a:r>
-              <a:rPr lang="en-US" dirty="0" smtClean="0"/>
-              <a:t>Abstract about project</a:t>
+              <a:rPr lang="en-US" dirty="0" err="1" smtClean="0"/>
+              <a:t>LockOn</a:t>
+            </a:r>
+            <a:r>
+              <a:rPr lang="en-US" smtClean="0"/>
+              <a:t> is </a:t>
             </a:r>
             <a:endParaRPr lang="en-US" dirty="0"/>
           </a:p>
@@ -5444,7 +5482,7 @@
   <p:timing>
     <p:tnLst>
       <p:par>
-        <p:cTn xmlns:p14="http://schemas.microsoft.com/office/powerpoint/2010/main" id="1" dur="indefinite" restart="never" nodeType="tmRoot"/>
+        <p:cTn id="1" dur="indefinite" restart="never" nodeType="tmRoot"/>
       </p:par>
     </p:tnLst>
   </p:timing>
@@ -5573,7 +5611,7 @@
   <p:timing>
     <p:tnLst>
       <p:par>
-        <p:cTn xmlns:p14="http://schemas.microsoft.com/office/powerpoint/2010/main" id="1" dur="indefinite" restart="never" nodeType="tmRoot"/>
+        <p:cTn id="1" dur="indefinite" restart="never" nodeType="tmRoot"/>
       </p:par>
     </p:tnLst>
   </p:timing>
@@ -5622,23 +5660,111 @@
       </p:sp>
       <p:sp>
         <p:nvSpPr>
-          <p:cNvPr id="3" name="Content Placeholder 2"/>
-          <p:cNvSpPr>
-            <a:spLocks noGrp="1"/>
-          </p:cNvSpPr>
-          <p:nvPr>
-            <p:ph idx="1"/>
-          </p:nvPr>
-        </p:nvSpPr>
-        <p:spPr/>
-        <p:txBody>
-          <a:bodyPr/>
-          <a:lstStyle/>
-          <a:p>
-            <a:endParaRPr lang="en-US"/>
-          </a:p>
-        </p:txBody>
-      </p:sp>
+          <p:cNvPr id="4" name="Content Placeholder 3"/>
+          <p:cNvSpPr>
+            <a:spLocks noGrp="1"/>
+          </p:cNvSpPr>
+          <p:nvPr>
+            <p:ph sz="half" idx="1"/>
+          </p:nvPr>
+        </p:nvSpPr>
+        <p:spPr>
+          <a:xfrm>
+            <a:off x="1371599" y="2285999"/>
+            <a:ext cx="5519057" cy="3581401"/>
+          </a:xfrm>
+        </p:spPr>
+        <p:txBody>
+          <a:bodyPr>
+            <a:normAutofit fontScale="92500" lnSpcReduction="10000"/>
+          </a:bodyPr>
+          <a:lstStyle/>
+          <a:p>
+            <a:r>
+              <a:rPr lang="en-US" dirty="0"/>
+              <a:t>CRISPR/Cas9 Endonuclease System. Cas9 and a synthetic </a:t>
+            </a:r>
+            <a:r>
+              <a:rPr lang="en-US" dirty="0" err="1"/>
+              <a:t>gRNA</a:t>
+            </a:r>
+            <a:r>
+              <a:rPr lang="en-US" dirty="0"/>
+              <a:t> with the spacer sequence is coupled to form a Cas9-gRNA </a:t>
+            </a:r>
+            <a:r>
+              <a:rPr lang="en-US" dirty="0" smtClean="0"/>
+              <a:t>complex</a:t>
+            </a:r>
+          </a:p>
+          <a:p>
+            <a:r>
+              <a:rPr lang="en-US" dirty="0" smtClean="0"/>
+              <a:t>The </a:t>
+            </a:r>
+            <a:r>
+              <a:rPr lang="en-US" dirty="0"/>
+              <a:t>Cas9-gRNA complex binds to the gene of interest (blue) that is immediately followed by a PAM (</a:t>
+            </a:r>
+            <a:r>
+              <a:rPr lang="en-US" dirty="0" smtClean="0"/>
+              <a:t>orange)</a:t>
+            </a:r>
+          </a:p>
+          <a:p>
+            <a:r>
+              <a:rPr lang="en-US" dirty="0" smtClean="0"/>
+              <a:t>If </a:t>
+            </a:r>
+            <a:r>
+              <a:rPr lang="en-US" dirty="0"/>
+              <a:t>there is sufficient homology between the target site and the </a:t>
+            </a:r>
+            <a:r>
+              <a:rPr lang="en-US" dirty="0" err="1"/>
+              <a:t>gRNA</a:t>
+            </a:r>
+            <a:r>
+              <a:rPr lang="en-US" dirty="0"/>
+              <a:t> and there exists a PAM, Cas9 cuts the DNA and exits, leaving the damaged DNA to repair itself either by Non-Homologous-End-Joining or Homology-Directed-Repair (Not Shown) to introduce mutations that will disrupt and silence the targeted </a:t>
+            </a:r>
+            <a:r>
+              <a:rPr lang="en-US" dirty="0" smtClean="0"/>
+              <a:t>gene</a:t>
+            </a:r>
+            <a:endParaRPr lang="en-US" dirty="0"/>
+          </a:p>
+        </p:txBody>
+      </p:sp>
+      <p:pic>
+        <p:nvPicPr>
+          <p:cNvPr id="6" name="Content Placeholder 5"/>
+          <p:cNvPicPr>
+            <a:picLocks noGrp="1" noChangeAspect="1"/>
+          </p:cNvPicPr>
+          <p:nvPr>
+            <p:ph sz="half" idx="2"/>
+          </p:nvPr>
+        </p:nvPicPr>
+        <p:blipFill>
+          <a:blip r:embed="rId2">
+            <a:extLst>
+              <a:ext uri="{28A0092B-C50C-407E-A947-70E740481C1C}">
+                <a14:useLocalDpi xmlns:a14="http://schemas.microsoft.com/office/drawing/2010/main" val="0"/>
+              </a:ext>
+            </a:extLst>
+          </a:blip>
+          <a:stretch>
+            <a:fillRect/>
+          </a:stretch>
+        </p:blipFill>
+        <p:spPr>
+          <a:xfrm>
+            <a:off x="7489684" y="603755"/>
+            <a:ext cx="4103602" cy="5836503"/>
+          </a:xfrm>
+        </p:spPr>
+      </p:pic>
     </p:spTree>
     <p:extLst>
       <p:ext uri="{BB962C8B-B14F-4D97-AF65-F5344CB8AC3E}">
@@ -5652,7 +5778,7 @@
   <p:timing>
     <p:tnLst>
       <p:par>
-        <p:cTn xmlns:p14="http://schemas.microsoft.com/office/powerpoint/2010/main" id="1" dur="indefinite" restart="never" nodeType="tmRoot"/>
+        <p:cTn id="1" dur="indefinite" restart="never" nodeType="tmRoot"/>
       </p:par>
     </p:tnLst>
   </p:timing>
@@ -5739,7 +5865,7 @@
   <p:timing>
     <p:tnLst>
       <p:par>
-        <p:cTn xmlns:p14="http://schemas.microsoft.com/office/powerpoint/2010/main" id="1" dur="indefinite" restart="never" nodeType="tmRoot"/>
+        <p:cTn id="1" dur="indefinite" restart="never" nodeType="tmRoot"/>
       </p:par>
     </p:tnLst>
   </p:timing>
@@ -5938,7 +6064,7 @@
   <a:extraClrSchemeLst/>
   <a:extLst>
     <a:ext uri="{05A4C25C-085E-4340-85A3-A5531E510DB2}">
-      <thm15:themeFamily xmlns:thm15="http://schemas.microsoft.com/office/thememl/2012/main" xmlns="" name="Crop" id="{EC9488ED-E761-4D60-9AC4-764D1FE2C171}" vid="{CE19780C-D67D-4C13-9DE9-A52BC3BA51B4}"/>
+      <thm15:themeFamily xmlns:thm15="http://schemas.microsoft.com/office/thememl/2012/main" name="Crop" id="{EC9488ED-E761-4D60-9AC4-764D1FE2C171}" vid="{CE19780C-D67D-4C13-9DE9-A52BC3BA51B4}"/>
     </a:ext>
   </a:extLst>
 </a:theme>

</xml_diff>